<commit_message>
small changes to due dates for lecture #4
</commit_message>
<xml_diff>
--- a/classes/prog2015/Lab4.pptx
+++ b/classes/prog2015/Lab4.pptx
@@ -294,7 +294,7 @@
             <a:fld id="{1D8BD707-D9CF-40AE-B4C6-C98DA3205C09}" type="datetimeFigureOut">
               <a:rPr lang="en-US" smtClean="0"/>
               <a:pPr/>
-              <a:t>9/12/2015</a:t>
+              <a:t>9/15/2015</a:t>
             </a:fld>
             <a:endParaRPr lang="en-US"/>
           </a:p>
@@ -461,7 +461,7 @@
             <a:fld id="{1D8BD707-D9CF-40AE-B4C6-C98DA3205C09}" type="datetimeFigureOut">
               <a:rPr lang="en-US" smtClean="0"/>
               <a:pPr/>
-              <a:t>9/12/2015</a:t>
+              <a:t>9/15/2015</a:t>
             </a:fld>
             <a:endParaRPr lang="en-US"/>
           </a:p>
@@ -638,7 +638,7 @@
             <a:fld id="{1D8BD707-D9CF-40AE-B4C6-C98DA3205C09}" type="datetimeFigureOut">
               <a:rPr lang="en-US" smtClean="0"/>
               <a:pPr/>
-              <a:t>9/12/2015</a:t>
+              <a:t>9/15/2015</a:t>
             </a:fld>
             <a:endParaRPr lang="en-US"/>
           </a:p>
@@ -805,7 +805,7 @@
             <a:fld id="{1D8BD707-D9CF-40AE-B4C6-C98DA3205C09}" type="datetimeFigureOut">
               <a:rPr lang="en-US" smtClean="0"/>
               <a:pPr/>
-              <a:t>9/12/2015</a:t>
+              <a:t>9/15/2015</a:t>
             </a:fld>
             <a:endParaRPr lang="en-US"/>
           </a:p>
@@ -1048,7 +1048,7 @@
             <a:fld id="{1D8BD707-D9CF-40AE-B4C6-C98DA3205C09}" type="datetimeFigureOut">
               <a:rPr lang="en-US" smtClean="0"/>
               <a:pPr/>
-              <a:t>9/12/2015</a:t>
+              <a:t>9/15/2015</a:t>
             </a:fld>
             <a:endParaRPr lang="en-US"/>
           </a:p>
@@ -1333,7 +1333,7 @@
             <a:fld id="{1D8BD707-D9CF-40AE-B4C6-C98DA3205C09}" type="datetimeFigureOut">
               <a:rPr lang="en-US" smtClean="0"/>
               <a:pPr/>
-              <a:t>9/12/2015</a:t>
+              <a:t>9/15/2015</a:t>
             </a:fld>
             <a:endParaRPr lang="en-US"/>
           </a:p>
@@ -1752,7 +1752,7 @@
             <a:fld id="{1D8BD707-D9CF-40AE-B4C6-C98DA3205C09}" type="datetimeFigureOut">
               <a:rPr lang="en-US" smtClean="0"/>
               <a:pPr/>
-              <a:t>9/12/2015</a:t>
+              <a:t>9/15/2015</a:t>
             </a:fld>
             <a:endParaRPr lang="en-US"/>
           </a:p>
@@ -1867,7 +1867,7 @@
             <a:fld id="{1D8BD707-D9CF-40AE-B4C6-C98DA3205C09}" type="datetimeFigureOut">
               <a:rPr lang="en-US" smtClean="0"/>
               <a:pPr/>
-              <a:t>9/12/2015</a:t>
+              <a:t>9/15/2015</a:t>
             </a:fld>
             <a:endParaRPr lang="en-US"/>
           </a:p>
@@ -1959,7 +1959,7 @@
             <a:fld id="{1D8BD707-D9CF-40AE-B4C6-C98DA3205C09}" type="datetimeFigureOut">
               <a:rPr lang="en-US" smtClean="0"/>
               <a:pPr/>
-              <a:t>9/12/2015</a:t>
+              <a:t>9/15/2015</a:t>
             </a:fld>
             <a:endParaRPr lang="en-US"/>
           </a:p>
@@ -2233,7 +2233,7 @@
             <a:fld id="{1D8BD707-D9CF-40AE-B4C6-C98DA3205C09}" type="datetimeFigureOut">
               <a:rPr lang="en-US" smtClean="0"/>
               <a:pPr/>
-              <a:t>9/12/2015</a:t>
+              <a:t>9/15/2015</a:t>
             </a:fld>
             <a:endParaRPr lang="en-US"/>
           </a:p>
@@ -2483,7 +2483,7 @@
             <a:fld id="{1D8BD707-D9CF-40AE-B4C6-C98DA3205C09}" type="datetimeFigureOut">
               <a:rPr lang="en-US" smtClean="0"/>
               <a:pPr/>
-              <a:t>9/12/2015</a:t>
+              <a:t>9/15/2015</a:t>
             </a:fld>
             <a:endParaRPr lang="en-US"/>
           </a:p>
@@ -2693,7 +2693,7 @@
             <a:fld id="{1D8BD707-D9CF-40AE-B4C6-C98DA3205C09}" type="datetimeFigureOut">
               <a:rPr lang="en-US" smtClean="0"/>
               <a:pPr/>
-              <a:t>9/12/2015</a:t>
+              <a:t>9/15/2015</a:t>
             </a:fld>
             <a:endParaRPr lang="en-US"/>
           </a:p>
@@ -3396,23 +3396,44 @@
                 <a:latin typeface="Arial" pitchFamily="34" charset="0"/>
                 <a:cs typeface="Arial" pitchFamily="34" charset="0"/>
               </a:rPr>
-              <a:t>Lab # 3 due Sep. 21 before class</a:t>
-            </a:r>
-          </a:p>
-          <a:p>
+              <a:t>Lab # </a:t>
+            </a:r>
             <a:r>
               <a:rPr lang="en-US" dirty="0" smtClean="0">
                 <a:latin typeface="Arial" pitchFamily="34" charset="0"/>
                 <a:cs typeface="Arial" pitchFamily="34" charset="0"/>
               </a:rPr>
-              <a:t>Here</a:t>
+              <a:t>4 </a:t>
             </a:r>
             <a:r>
               <a:rPr lang="en-US" dirty="0" smtClean="0">
                 <a:latin typeface="Arial" pitchFamily="34" charset="0"/>
                 <a:cs typeface="Arial" pitchFamily="34" charset="0"/>
               </a:rPr>
-              <a:t>:  </a:t>
+              <a:t>due Sep. </a:t>
+            </a:r>
+            <a:r>
+              <a:rPr lang="en-US" dirty="0" smtClean="0">
+                <a:latin typeface="Arial" pitchFamily="34" charset="0"/>
+                <a:cs typeface="Arial" pitchFamily="34" charset="0"/>
+              </a:rPr>
+              <a:t>23  (Wed!) before </a:t>
+            </a:r>
+            <a:r>
+              <a:rPr lang="en-US" dirty="0" smtClean="0">
+                <a:latin typeface="Arial" pitchFamily="34" charset="0"/>
+                <a:cs typeface="Arial" pitchFamily="34" charset="0"/>
+              </a:rPr>
+              <a:t>class</a:t>
+            </a:r>
+          </a:p>
+          <a:p>
+            <a:r>
+              <a:rPr lang="en-US" dirty="0" smtClean="0">
+                <a:latin typeface="Arial" pitchFamily="34" charset="0"/>
+                <a:cs typeface="Arial" pitchFamily="34" charset="0"/>
+              </a:rPr>
+              <a:t>Here:  </a:t>
             </a:r>
           </a:p>
           <a:p>
@@ -3905,15 +3926,7 @@
             </a:r>
             <a:r>
               <a:rPr lang="en-US" dirty="0" smtClean="0"/>
-              <a:t> </a:t>
-            </a:r>
-            <a:r>
-              <a:rPr lang="en-US" dirty="0" smtClean="0"/>
-              <a:t>and </a:t>
-            </a:r>
-            <a:r>
-              <a:rPr lang="en-US" dirty="0" smtClean="0"/>
-              <a:t>rlinchan@uncc.edu</a:t>
+              <a:t> and rlinchan@uncc.edu</a:t>
             </a:r>
             <a:endParaRPr lang="en-US" dirty="0"/>
           </a:p>
@@ -3957,8 +3970,8 @@
         </p:nvSpPr>
         <p:spPr>
           <a:xfrm>
-            <a:off x="2786896" y="4572000"/>
-            <a:ext cx="3570208" cy="369332"/>
+            <a:off x="2667000" y="4572000"/>
+            <a:ext cx="4211409" cy="369332"/>
           </a:xfrm>
           <a:prstGeom prst="rect">
             <a:avLst/>
@@ -3975,7 +3988,21 @@
                 <a:latin typeface="Arial" pitchFamily="34" charset="0"/>
                 <a:cs typeface="Arial" pitchFamily="34" charset="0"/>
               </a:rPr>
-              <a:t>Lab # 3 due Sep. 21 before class</a:t>
+              <a:t>Lab # 3 due Sep. </a:t>
+            </a:r>
+            <a:r>
+              <a:rPr lang="en-US" smtClean="0">
+                <a:latin typeface="Arial" pitchFamily="34" charset="0"/>
+                <a:cs typeface="Arial" pitchFamily="34" charset="0"/>
+              </a:rPr>
+              <a:t>23 (wed) </a:t>
+            </a:r>
+            <a:r>
+              <a:rPr lang="en-US" dirty="0" smtClean="0">
+                <a:latin typeface="Arial" pitchFamily="34" charset="0"/>
+                <a:cs typeface="Arial" pitchFamily="34" charset="0"/>
+              </a:rPr>
+              <a:t>before class</a:t>
             </a:r>
           </a:p>
         </p:txBody>

</xml_diff>